<commit_message>
Initial java node & ppt
</commit_message>
<xml_diff>
--- a/lambda-ppt.pptx
+++ b/lambda-ppt.pptx
@@ -10,6 +10,20 @@
     <p:sldId id="258" r:id="rId4"/>
     <p:sldId id="259" r:id="rId5"/>
     <p:sldId id="260" r:id="rId6"/>
+    <p:sldId id="261" r:id="rId7"/>
+    <p:sldId id="262" r:id="rId8"/>
+    <p:sldId id="263" r:id="rId9"/>
+    <p:sldId id="264" r:id="rId10"/>
+    <p:sldId id="265" r:id="rId11"/>
+    <p:sldId id="270" r:id="rId12"/>
+    <p:sldId id="267" r:id="rId13"/>
+    <p:sldId id="268" r:id="rId14"/>
+    <p:sldId id="271" r:id="rId15"/>
+    <p:sldId id="269" r:id="rId16"/>
+    <p:sldId id="272" r:id="rId17"/>
+    <p:sldId id="273" r:id="rId18"/>
+    <p:sldId id="266" r:id="rId19"/>
+    <p:sldId id="274" r:id="rId20"/>
   </p:sldIdLst>
   <p:sldSz cx="12192000" cy="6858000"/>
   <p:notesSz cx="6858000" cy="9144000"/>
@@ -130,9 +144,30 @@
         <p14:section name="Java" id="{D673AFF9-BAC9-4E27-B04C-977A9D710790}">
           <p14:sldIdLst>
             <p14:sldId id="260"/>
+            <p14:sldId id="261"/>
+            <p14:sldId id="262"/>
+            <p14:sldId id="263"/>
+            <p14:sldId id="264"/>
+            <p14:sldId id="265"/>
+            <p14:sldId id="270"/>
+            <p14:sldId id="267"/>
+            <p14:sldId id="268"/>
+            <p14:sldId id="271"/>
+            <p14:sldId id="269"/>
+            <p14:sldId id="272"/>
+            <p14:sldId id="273"/>
+          </p14:sldIdLst>
+        </p14:section>
+        <p14:section name="总结" id="{EFC48B01-BE7C-407C-934A-0F901FA70BC9}">
+          <p14:sldIdLst>
+            <p14:sldId id="266"/>
+            <p14:sldId id="274"/>
           </p14:sldIdLst>
         </p14:section>
       </p14:sectionLst>
+    </p:ext>
+    <p:ext uri="{EFAFB233-063F-42B5-8137-9DF3F51BA10A}">
+      <p15:sldGuideLst xmlns:p15="http://schemas.microsoft.com/office/powerpoint/2012/main"/>
     </p:ext>
   </p:extLst>
 </p:presentation>
@@ -269,7 +304,7 @@
           <a:p>
             <a:fld id="{63999BEB-2D66-4060-9336-20566527F529}" type="datetimeFigureOut">
               <a:rPr lang="zh-CN" altLang="en-US" smtClean="0"/>
-              <a:t>2020/5/17</a:t>
+              <a:t>2020/5/20</a:t>
             </a:fld>
             <a:endParaRPr lang="zh-CN" altLang="en-US"/>
           </a:p>
@@ -439,7 +474,7 @@
           <a:p>
             <a:fld id="{63999BEB-2D66-4060-9336-20566527F529}" type="datetimeFigureOut">
               <a:rPr lang="zh-CN" altLang="en-US" smtClean="0"/>
-              <a:t>2020/5/17</a:t>
+              <a:t>2020/5/20</a:t>
             </a:fld>
             <a:endParaRPr lang="zh-CN" altLang="en-US"/>
           </a:p>
@@ -619,7 +654,7 @@
           <a:p>
             <a:fld id="{63999BEB-2D66-4060-9336-20566527F529}" type="datetimeFigureOut">
               <a:rPr lang="zh-CN" altLang="en-US" smtClean="0"/>
-              <a:t>2020/5/17</a:t>
+              <a:t>2020/5/20</a:t>
             </a:fld>
             <a:endParaRPr lang="zh-CN" altLang="en-US"/>
           </a:p>
@@ -789,7 +824,7 @@
           <a:p>
             <a:fld id="{63999BEB-2D66-4060-9336-20566527F529}" type="datetimeFigureOut">
               <a:rPr lang="zh-CN" altLang="en-US" smtClean="0"/>
-              <a:t>2020/5/17</a:t>
+              <a:t>2020/5/20</a:t>
             </a:fld>
             <a:endParaRPr lang="zh-CN" altLang="en-US"/>
           </a:p>
@@ -847,6 +882,13 @@
   <p:clrMapOvr>
     <a:masterClrMapping/>
   </p:clrMapOvr>
+  <p:timing>
+    <p:tnLst>
+      <p:par>
+        <p:cTn id="1" dur="indefinite" restart="never" nodeType="tmRoot"/>
+      </p:par>
+    </p:tnLst>
+  </p:timing>
 </p:sldLayout>
 </file>
 
@@ -1035,7 +1077,7 @@
           <a:p>
             <a:fld id="{63999BEB-2D66-4060-9336-20566527F529}" type="datetimeFigureOut">
               <a:rPr lang="zh-CN" altLang="en-US" smtClean="0"/>
-              <a:t>2020/5/17</a:t>
+              <a:t>2020/5/20</a:t>
             </a:fld>
             <a:endParaRPr lang="zh-CN" altLang="en-US"/>
           </a:p>
@@ -1267,7 +1309,7 @@
           <a:p>
             <a:fld id="{63999BEB-2D66-4060-9336-20566527F529}" type="datetimeFigureOut">
               <a:rPr lang="zh-CN" altLang="en-US" smtClean="0"/>
-              <a:t>2020/5/17</a:t>
+              <a:t>2020/5/20</a:t>
             </a:fld>
             <a:endParaRPr lang="zh-CN" altLang="en-US"/>
           </a:p>
@@ -1634,7 +1676,7 @@
           <a:p>
             <a:fld id="{63999BEB-2D66-4060-9336-20566527F529}" type="datetimeFigureOut">
               <a:rPr lang="zh-CN" altLang="en-US" smtClean="0"/>
-              <a:t>2020/5/17</a:t>
+              <a:t>2020/5/20</a:t>
             </a:fld>
             <a:endParaRPr lang="zh-CN" altLang="en-US"/>
           </a:p>
@@ -1752,7 +1794,7 @@
           <a:p>
             <a:fld id="{63999BEB-2D66-4060-9336-20566527F529}" type="datetimeFigureOut">
               <a:rPr lang="zh-CN" altLang="en-US" smtClean="0"/>
-              <a:t>2020/5/17</a:t>
+              <a:t>2020/5/20</a:t>
             </a:fld>
             <a:endParaRPr lang="zh-CN" altLang="en-US"/>
           </a:p>
@@ -1847,7 +1889,7 @@
           <a:p>
             <a:fld id="{63999BEB-2D66-4060-9336-20566527F529}" type="datetimeFigureOut">
               <a:rPr lang="zh-CN" altLang="en-US" smtClean="0"/>
-              <a:t>2020/5/17</a:t>
+              <a:t>2020/5/20</a:t>
             </a:fld>
             <a:endParaRPr lang="zh-CN" altLang="en-US"/>
           </a:p>
@@ -2124,7 +2166,7 @@
           <a:p>
             <a:fld id="{63999BEB-2D66-4060-9336-20566527F529}" type="datetimeFigureOut">
               <a:rPr lang="zh-CN" altLang="en-US" smtClean="0"/>
-              <a:t>2020/5/17</a:t>
+              <a:t>2020/5/20</a:t>
             </a:fld>
             <a:endParaRPr lang="zh-CN" altLang="en-US"/>
           </a:p>
@@ -2377,7 +2419,7 @@
           <a:p>
             <a:fld id="{63999BEB-2D66-4060-9336-20566527F529}" type="datetimeFigureOut">
               <a:rPr lang="zh-CN" altLang="en-US" smtClean="0"/>
-              <a:t>2020/5/17</a:t>
+              <a:t>2020/5/20</a:t>
             </a:fld>
             <a:endParaRPr lang="zh-CN" altLang="en-US"/>
           </a:p>
@@ -2590,7 +2632,7 @@
           <a:p>
             <a:fld id="{63999BEB-2D66-4060-9336-20566527F529}" type="datetimeFigureOut">
               <a:rPr lang="zh-CN" altLang="en-US" smtClean="0"/>
-              <a:t>2020/5/17</a:t>
+              <a:t>2020/5/20</a:t>
             </a:fld>
             <a:endParaRPr lang="zh-CN" altLang="en-US"/>
           </a:p>
@@ -3057,7 +3099,9 @@
         </p:nvSpPr>
         <p:spPr/>
         <p:txBody>
-          <a:bodyPr/>
+          <a:bodyPr>
+            <a:normAutofit lnSpcReduction="10000"/>
+          </a:bodyPr>
           <a:lstStyle/>
           <a:p>
             <a:pPr algn="r"/>
@@ -3090,6 +3134,25 @@
             <a:r>
               <a:rPr lang="en-US" altLang="zh-CN" dirty="0" smtClean="0"/>
               <a:t>17307130285</a:t>
+            </a:r>
+          </a:p>
+          <a:p>
+            <a:pPr algn="r"/>
+            <a:r>
+              <a:rPr lang="zh-CN" altLang="en-US" dirty="0"/>
+              <a:t>有</a:t>
+            </a:r>
+            <a:r>
+              <a:rPr lang="zh-CN" altLang="en-US" dirty="0" smtClean="0"/>
+              <a:t>时间的话我会换个</a:t>
+            </a:r>
+            <a:r>
+              <a:rPr lang="en-US" altLang="zh-CN" dirty="0" smtClean="0"/>
+              <a:t>PPT</a:t>
+            </a:r>
+            <a:r>
+              <a:rPr lang="zh-CN" altLang="en-US" dirty="0" smtClean="0"/>
+              <a:t>模板</a:t>
             </a:r>
             <a:endParaRPr lang="zh-CN" altLang="en-US" dirty="0"/>
           </a:p>
@@ -3105,6 +3168,1281 @@
   <p:clrMapOvr>
     <a:masterClrMapping/>
   </p:clrMapOvr>
+  <p:timing>
+    <p:tnLst>
+      <p:par>
+        <p:cTn id="1" dur="indefinite" restart="never" nodeType="tmRoot"/>
+      </p:par>
+    </p:tnLst>
+  </p:timing>
+</p:sld>
+</file>
+
+<file path=ppt/slides/slide10.xml><?xml version="1.0" encoding="utf-8"?>
+<p:sld xmlns:a="http://schemas.openxmlformats.org/drawingml/2006/main" xmlns:r="http://schemas.openxmlformats.org/officeDocument/2006/relationships" xmlns:p="http://schemas.openxmlformats.org/presentationml/2006/main">
+  <p:cSld>
+    <p:spTree>
+      <p:nvGrpSpPr>
+        <p:cNvPr id="1" name=""/>
+        <p:cNvGrpSpPr/>
+        <p:nvPr/>
+      </p:nvGrpSpPr>
+      <p:grpSpPr>
+        <a:xfrm>
+          <a:off x="0" y="0"/>
+          <a:ext cx="0" cy="0"/>
+          <a:chOff x="0" y="0"/>
+          <a:chExt cx="0" cy="0"/>
+        </a:xfrm>
+      </p:grpSpPr>
+      <p:sp>
+        <p:nvSpPr>
+          <p:cNvPr id="2" name="标题 1"/>
+          <p:cNvSpPr>
+            <a:spLocks noGrp="1"/>
+          </p:cNvSpPr>
+          <p:nvPr>
+            <p:ph type="title"/>
+          </p:nvPr>
+        </p:nvSpPr>
+        <p:spPr/>
+        <p:txBody>
+          <a:bodyPr/>
+          <a:lstStyle/>
+          <a:p>
+            <a:r>
+              <a:rPr lang="zh-CN" altLang="en-US" dirty="0" smtClean="0"/>
+              <a:t>变量捕获</a:t>
+            </a:r>
+            <a:endParaRPr lang="zh-CN" altLang="en-US" dirty="0"/>
+          </a:p>
+        </p:txBody>
+      </p:sp>
+      <p:sp>
+        <p:nvSpPr>
+          <p:cNvPr id="3" name="内容占位符 2"/>
+          <p:cNvSpPr>
+            <a:spLocks noGrp="1"/>
+          </p:cNvSpPr>
+          <p:nvPr>
+            <p:ph idx="1"/>
+          </p:nvPr>
+        </p:nvSpPr>
+        <p:spPr/>
+        <p:txBody>
+          <a:bodyPr/>
+          <a:lstStyle/>
+          <a:p>
+            <a:r>
+              <a:rPr lang="en-US" altLang="zh-CN" dirty="0"/>
+              <a:t>lambda</a:t>
+            </a:r>
+            <a:r>
+              <a:rPr lang="zh-CN" altLang="en-US" dirty="0"/>
+              <a:t>表达式可以获取或设置其外层类的实例或静态变量的值，以及调用其外层类定义的</a:t>
+            </a:r>
+            <a:r>
+              <a:rPr lang="zh-CN" altLang="en-US" dirty="0" smtClean="0"/>
+              <a:t>方法</a:t>
+            </a:r>
+            <a:endParaRPr lang="en-US" altLang="zh-CN" dirty="0" smtClean="0"/>
+          </a:p>
+          <a:p>
+            <a:r>
+              <a:rPr lang="zh-CN" altLang="en-US" dirty="0" smtClean="0"/>
+              <a:t>具有</a:t>
+            </a:r>
+            <a:r>
+              <a:rPr lang="en-US" altLang="zh-CN" dirty="0" smtClean="0"/>
+              <a:t>final</a:t>
+            </a:r>
+            <a:r>
+              <a:rPr lang="zh-CN" altLang="en-US" dirty="0" smtClean="0"/>
+              <a:t>或者</a:t>
+            </a:r>
+            <a:r>
+              <a:rPr lang="en-US" altLang="zh-CN" dirty="0" smtClean="0"/>
+              <a:t>effectively final</a:t>
+            </a:r>
+            <a:r>
+              <a:rPr lang="zh-CN" altLang="en-US" dirty="0" smtClean="0"/>
+              <a:t>语义</a:t>
+            </a:r>
+            <a:endParaRPr lang="zh-CN" altLang="en-US" dirty="0"/>
+          </a:p>
+        </p:txBody>
+      </p:sp>
+      <p:pic>
+        <p:nvPicPr>
+          <p:cNvPr id="7" name="图片 6"/>
+          <p:cNvPicPr>
+            <a:picLocks noChangeAspect="1"/>
+          </p:cNvPicPr>
+          <p:nvPr/>
+        </p:nvPicPr>
+        <p:blipFill>
+          <a:blip r:embed="rId2"/>
+          <a:stretch>
+            <a:fillRect/>
+          </a:stretch>
+        </p:blipFill>
+        <p:spPr>
+          <a:xfrm>
+            <a:off x="838200" y="3093684"/>
+            <a:ext cx="10515600" cy="3083279"/>
+          </a:xfrm>
+          <a:prstGeom prst="rect">
+            <a:avLst/>
+          </a:prstGeom>
+        </p:spPr>
+      </p:pic>
+    </p:spTree>
+    <p:extLst>
+      <p:ext uri="{BB962C8B-B14F-4D97-AF65-F5344CB8AC3E}">
+        <p14:creationId xmlns:p14="http://schemas.microsoft.com/office/powerpoint/2010/main" val="1733437536"/>
+      </p:ext>
+    </p:extLst>
+  </p:cSld>
+  <p:clrMapOvr>
+    <a:masterClrMapping/>
+  </p:clrMapOvr>
+  <p:timing>
+    <p:tnLst>
+      <p:par>
+        <p:cTn id="1" dur="indefinite" restart="never" nodeType="tmRoot"/>
+      </p:par>
+    </p:tnLst>
+  </p:timing>
+</p:sld>
+</file>
+
+<file path=ppt/slides/slide11.xml><?xml version="1.0" encoding="utf-8"?>
+<p:sld xmlns:a="http://schemas.openxmlformats.org/drawingml/2006/main" xmlns:r="http://schemas.openxmlformats.org/officeDocument/2006/relationships" xmlns:p="http://schemas.openxmlformats.org/presentationml/2006/main">
+  <p:cSld>
+    <p:spTree>
+      <p:nvGrpSpPr>
+        <p:cNvPr id="1" name=""/>
+        <p:cNvGrpSpPr/>
+        <p:nvPr/>
+      </p:nvGrpSpPr>
+      <p:grpSpPr>
+        <a:xfrm>
+          <a:off x="0" y="0"/>
+          <a:ext cx="0" cy="0"/>
+          <a:chOff x="0" y="0"/>
+          <a:chExt cx="0" cy="0"/>
+        </a:xfrm>
+      </p:grpSpPr>
+      <p:sp>
+        <p:nvSpPr>
+          <p:cNvPr id="2" name="标题 1"/>
+          <p:cNvSpPr>
+            <a:spLocks noGrp="1"/>
+          </p:cNvSpPr>
+          <p:nvPr>
+            <p:ph type="title"/>
+          </p:nvPr>
+        </p:nvSpPr>
+        <p:spPr/>
+        <p:txBody>
+          <a:bodyPr/>
+          <a:lstStyle/>
+          <a:p>
+            <a:r>
+              <a:rPr lang="zh-CN" altLang="en-US" dirty="0" smtClean="0"/>
+              <a:t>匿名内部类？</a:t>
+            </a:r>
+            <a:endParaRPr lang="zh-CN" altLang="en-US" dirty="0"/>
+          </a:p>
+        </p:txBody>
+      </p:sp>
+      <p:pic>
+        <p:nvPicPr>
+          <p:cNvPr id="4" name="内容占位符 3"/>
+          <p:cNvPicPr>
+            <a:picLocks noGrp="1" noChangeAspect="1"/>
+          </p:cNvPicPr>
+          <p:nvPr>
+            <p:ph idx="1"/>
+          </p:nvPr>
+        </p:nvPicPr>
+        <p:blipFill>
+          <a:blip r:embed="rId2"/>
+          <a:stretch>
+            <a:fillRect/>
+          </a:stretch>
+        </p:blipFill>
+        <p:spPr>
+          <a:xfrm>
+            <a:off x="838201" y="1913110"/>
+            <a:ext cx="10515600" cy="3834150"/>
+          </a:xfrm>
+          <a:prstGeom prst="rect">
+            <a:avLst/>
+          </a:prstGeom>
+        </p:spPr>
+      </p:pic>
+    </p:spTree>
+    <p:extLst>
+      <p:ext uri="{BB962C8B-B14F-4D97-AF65-F5344CB8AC3E}">
+        <p14:creationId xmlns:p14="http://schemas.microsoft.com/office/powerpoint/2010/main" val="1580928507"/>
+      </p:ext>
+    </p:extLst>
+  </p:cSld>
+  <p:clrMapOvr>
+    <a:masterClrMapping/>
+  </p:clrMapOvr>
+  <p:timing>
+    <p:tnLst>
+      <p:par>
+        <p:cTn id="1" dur="indefinite" restart="never" nodeType="tmRoot"/>
+      </p:par>
+    </p:tnLst>
+  </p:timing>
+</p:sld>
+</file>
+
+<file path=ppt/slides/slide12.xml><?xml version="1.0" encoding="utf-8"?>
+<p:sld xmlns:a="http://schemas.openxmlformats.org/drawingml/2006/main" xmlns:r="http://schemas.openxmlformats.org/officeDocument/2006/relationships" xmlns:p="http://schemas.openxmlformats.org/presentationml/2006/main">
+  <p:cSld>
+    <p:spTree>
+      <p:nvGrpSpPr>
+        <p:cNvPr id="1" name=""/>
+        <p:cNvGrpSpPr/>
+        <p:nvPr/>
+      </p:nvGrpSpPr>
+      <p:grpSpPr>
+        <a:xfrm>
+          <a:off x="0" y="0"/>
+          <a:ext cx="0" cy="0"/>
+          <a:chOff x="0" y="0"/>
+          <a:chExt cx="0" cy="0"/>
+        </a:xfrm>
+      </p:grpSpPr>
+      <p:sp>
+        <p:nvSpPr>
+          <p:cNvPr id="2" name="标题 1"/>
+          <p:cNvSpPr>
+            <a:spLocks noGrp="1"/>
+          </p:cNvSpPr>
+          <p:nvPr>
+            <p:ph type="title"/>
+          </p:nvPr>
+        </p:nvSpPr>
+        <p:spPr/>
+        <p:txBody>
+          <a:bodyPr/>
+          <a:lstStyle/>
+          <a:p>
+            <a:r>
+              <a:rPr lang="zh-CN" altLang="en-US" dirty="0" smtClean="0"/>
+              <a:t>不是匿名内部类</a:t>
+            </a:r>
+            <a:endParaRPr lang="zh-CN" altLang="en-US" dirty="0"/>
+          </a:p>
+        </p:txBody>
+      </p:sp>
+      <p:pic>
+        <p:nvPicPr>
+          <p:cNvPr id="8" name="内容占位符 7"/>
+          <p:cNvPicPr>
+            <a:picLocks noGrp="1" noChangeAspect="1"/>
+          </p:cNvPicPr>
+          <p:nvPr>
+            <p:ph idx="1"/>
+          </p:nvPr>
+        </p:nvPicPr>
+        <p:blipFill>
+          <a:blip r:embed="rId2"/>
+          <a:stretch>
+            <a:fillRect/>
+          </a:stretch>
+        </p:blipFill>
+        <p:spPr>
+          <a:xfrm>
+            <a:off x="101341" y="1558248"/>
+            <a:ext cx="5778151" cy="4351338"/>
+          </a:xfrm>
+          <a:prstGeom prst="rect">
+            <a:avLst/>
+          </a:prstGeom>
+        </p:spPr>
+      </p:pic>
+      <p:pic>
+        <p:nvPicPr>
+          <p:cNvPr id="9" name="图片 8"/>
+          <p:cNvPicPr>
+            <a:picLocks noChangeAspect="1"/>
+          </p:cNvPicPr>
+          <p:nvPr/>
+        </p:nvPicPr>
+        <p:blipFill>
+          <a:blip r:embed="rId3"/>
+          <a:stretch>
+            <a:fillRect/>
+          </a:stretch>
+        </p:blipFill>
+        <p:spPr>
+          <a:xfrm>
+            <a:off x="5879492" y="1558248"/>
+            <a:ext cx="6211167" cy="3543795"/>
+          </a:xfrm>
+          <a:prstGeom prst="rect">
+            <a:avLst/>
+          </a:prstGeom>
+        </p:spPr>
+      </p:pic>
+    </p:spTree>
+    <p:extLst>
+      <p:ext uri="{BB962C8B-B14F-4D97-AF65-F5344CB8AC3E}">
+        <p14:creationId xmlns:p14="http://schemas.microsoft.com/office/powerpoint/2010/main" val="2492854569"/>
+      </p:ext>
+    </p:extLst>
+  </p:cSld>
+  <p:clrMapOvr>
+    <a:masterClrMapping/>
+  </p:clrMapOvr>
+  <p:timing>
+    <p:tnLst>
+      <p:par>
+        <p:cTn id="1" dur="indefinite" restart="never" nodeType="tmRoot"/>
+      </p:par>
+    </p:tnLst>
+  </p:timing>
+</p:sld>
+</file>
+
+<file path=ppt/slides/slide13.xml><?xml version="1.0" encoding="utf-8"?>
+<p:sld xmlns:a="http://schemas.openxmlformats.org/drawingml/2006/main" xmlns:r="http://schemas.openxmlformats.org/officeDocument/2006/relationships" xmlns:p="http://schemas.openxmlformats.org/presentationml/2006/main">
+  <p:cSld>
+    <p:spTree>
+      <p:nvGrpSpPr>
+        <p:cNvPr id="1" name=""/>
+        <p:cNvGrpSpPr/>
+        <p:nvPr/>
+      </p:nvGrpSpPr>
+      <p:grpSpPr>
+        <a:xfrm>
+          <a:off x="0" y="0"/>
+          <a:ext cx="0" cy="0"/>
+          <a:chOff x="0" y="0"/>
+          <a:chExt cx="0" cy="0"/>
+        </a:xfrm>
+      </p:grpSpPr>
+      <p:sp>
+        <p:nvSpPr>
+          <p:cNvPr id="2" name="标题 1"/>
+          <p:cNvSpPr>
+            <a:spLocks noGrp="1"/>
+          </p:cNvSpPr>
+          <p:nvPr>
+            <p:ph type="title"/>
+          </p:nvPr>
+        </p:nvSpPr>
+        <p:spPr/>
+        <p:txBody>
+          <a:bodyPr/>
+          <a:lstStyle/>
+          <a:p>
+            <a:r>
+              <a:rPr lang="zh-CN" altLang="en-US" dirty="0" smtClean="0"/>
+              <a:t>函数式接口</a:t>
+            </a:r>
+            <a:endParaRPr lang="zh-CN" altLang="en-US" dirty="0"/>
+          </a:p>
+        </p:txBody>
+      </p:sp>
+      <p:sp>
+        <p:nvSpPr>
+          <p:cNvPr id="3" name="内容占位符 2"/>
+          <p:cNvSpPr>
+            <a:spLocks noGrp="1"/>
+          </p:cNvSpPr>
+          <p:nvPr>
+            <p:ph idx="1"/>
+          </p:nvPr>
+        </p:nvSpPr>
+        <p:spPr/>
+        <p:txBody>
+          <a:bodyPr/>
+          <a:lstStyle/>
+          <a:p>
+            <a:r>
+              <a:rPr lang="en-US" altLang="zh-CN" dirty="0"/>
+              <a:t>1. </a:t>
+            </a:r>
+            <a:r>
+              <a:rPr lang="zh-CN" altLang="en-US" dirty="0" smtClean="0"/>
+              <a:t>代码简洁。函数式</a:t>
+            </a:r>
+            <a:r>
+              <a:rPr lang="zh-CN" altLang="en-US" dirty="0"/>
+              <a:t>编程写出的代码简洁且意图明确，</a:t>
+            </a:r>
+            <a:r>
+              <a:rPr lang="zh-CN" altLang="en-US" dirty="0" smtClean="0"/>
+              <a:t>使用</a:t>
+            </a:r>
+            <a:r>
+              <a:rPr lang="en-US" altLang="zh-CN" dirty="0" smtClean="0"/>
+              <a:t>stream</a:t>
+            </a:r>
+            <a:r>
+              <a:rPr lang="zh-CN" altLang="en-US" dirty="0" smtClean="0"/>
+              <a:t>接口</a:t>
+            </a:r>
+            <a:r>
+              <a:rPr lang="zh-CN" altLang="en-US" dirty="0"/>
+              <a:t>让你从此</a:t>
+            </a:r>
+            <a:r>
+              <a:rPr lang="zh-CN" altLang="en-US" dirty="0" smtClean="0"/>
+              <a:t>告别</a:t>
+            </a:r>
+            <a:r>
+              <a:rPr lang="en-US" altLang="zh-CN" dirty="0" smtClean="0"/>
+              <a:t>for</a:t>
+            </a:r>
+            <a:r>
+              <a:rPr lang="zh-CN" altLang="en-US" dirty="0" smtClean="0"/>
+              <a:t>循环</a:t>
+            </a:r>
+            <a:r>
+              <a:rPr lang="zh-CN" altLang="en-US" dirty="0"/>
+              <a:t>。</a:t>
+            </a:r>
+          </a:p>
+          <a:p>
+            <a:r>
+              <a:rPr lang="en-US" altLang="zh-CN" dirty="0"/>
+              <a:t>2. </a:t>
+            </a:r>
+            <a:r>
+              <a:rPr lang="zh-CN" altLang="en-US" dirty="0" smtClean="0"/>
+              <a:t>多</a:t>
+            </a:r>
+            <a:r>
+              <a:rPr lang="zh-CN" altLang="en-US" dirty="0"/>
+              <a:t>核</a:t>
+            </a:r>
+            <a:r>
+              <a:rPr lang="zh-CN" altLang="en-US" dirty="0" smtClean="0"/>
+              <a:t>友好。</a:t>
+            </a:r>
+            <a:r>
+              <a:rPr lang="en-US" altLang="zh-CN" dirty="0" smtClean="0"/>
+              <a:t>Java</a:t>
+            </a:r>
+            <a:r>
+              <a:rPr lang="zh-CN" altLang="en-US" dirty="0"/>
+              <a:t>函数式编程使得编写并行程序从未如此简单，你需要的全部就是调用</a:t>
+            </a:r>
+            <a:r>
+              <a:rPr lang="zh-CN" altLang="en-US" dirty="0" smtClean="0"/>
+              <a:t>一下</a:t>
+            </a:r>
+            <a:r>
+              <a:rPr lang="en-US" altLang="zh-CN" dirty="0" smtClean="0"/>
+              <a:t>parallel()</a:t>
+            </a:r>
+            <a:r>
+              <a:rPr lang="zh-CN" altLang="en-US" dirty="0" smtClean="0"/>
+              <a:t>方法</a:t>
+            </a:r>
+            <a:r>
+              <a:rPr lang="zh-CN" altLang="en-US" dirty="0"/>
+              <a:t>。</a:t>
+            </a:r>
+          </a:p>
+        </p:txBody>
+      </p:sp>
+    </p:spTree>
+    <p:extLst>
+      <p:ext uri="{BB962C8B-B14F-4D97-AF65-F5344CB8AC3E}">
+        <p14:creationId xmlns:p14="http://schemas.microsoft.com/office/powerpoint/2010/main" val="3937675755"/>
+      </p:ext>
+    </p:extLst>
+  </p:cSld>
+  <p:clrMapOvr>
+    <a:masterClrMapping/>
+  </p:clrMapOvr>
+  <p:timing>
+    <p:tnLst>
+      <p:par>
+        <p:cTn id="1" dur="indefinite" restart="never" nodeType="tmRoot"/>
+      </p:par>
+    </p:tnLst>
+  </p:timing>
+</p:sld>
+</file>
+
+<file path=ppt/slides/slide14.xml><?xml version="1.0" encoding="utf-8"?>
+<p:sld xmlns:a="http://schemas.openxmlformats.org/drawingml/2006/main" xmlns:r="http://schemas.openxmlformats.org/officeDocument/2006/relationships" xmlns:p="http://schemas.openxmlformats.org/presentationml/2006/main">
+  <p:cSld>
+    <p:spTree>
+      <p:nvGrpSpPr>
+        <p:cNvPr id="1" name=""/>
+        <p:cNvGrpSpPr/>
+        <p:nvPr/>
+      </p:nvGrpSpPr>
+      <p:grpSpPr>
+        <a:xfrm>
+          <a:off x="0" y="0"/>
+          <a:ext cx="0" cy="0"/>
+          <a:chOff x="0" y="0"/>
+          <a:chExt cx="0" cy="0"/>
+        </a:xfrm>
+      </p:grpSpPr>
+      <p:sp>
+        <p:nvSpPr>
+          <p:cNvPr id="2" name="标题 1"/>
+          <p:cNvSpPr>
+            <a:spLocks noGrp="1"/>
+          </p:cNvSpPr>
+          <p:nvPr>
+            <p:ph type="title"/>
+          </p:nvPr>
+        </p:nvSpPr>
+        <p:spPr/>
+        <p:txBody>
+          <a:bodyPr/>
+          <a:lstStyle/>
+          <a:p>
+            <a:r>
+              <a:rPr lang="zh-CN" altLang="en-US" dirty="0" smtClean="0"/>
+              <a:t>函数式接口与</a:t>
+            </a:r>
+            <a:r>
+              <a:rPr lang="en-US" altLang="zh-CN" dirty="0" smtClean="0"/>
+              <a:t>lambda</a:t>
+            </a:r>
+            <a:r>
+              <a:rPr lang="zh-CN" altLang="en-US" dirty="0" smtClean="0"/>
+              <a:t>表达式</a:t>
+            </a:r>
+            <a:endParaRPr lang="zh-CN" altLang="en-US" dirty="0"/>
+          </a:p>
+        </p:txBody>
+      </p:sp>
+      <p:pic>
+        <p:nvPicPr>
+          <p:cNvPr id="4" name="内容占位符 3"/>
+          <p:cNvPicPr>
+            <a:picLocks noGrp="1" noChangeAspect="1"/>
+          </p:cNvPicPr>
+          <p:nvPr>
+            <p:ph idx="1"/>
+          </p:nvPr>
+        </p:nvPicPr>
+        <p:blipFill>
+          <a:blip r:embed="rId2"/>
+          <a:stretch>
+            <a:fillRect/>
+          </a:stretch>
+        </p:blipFill>
+        <p:spPr>
+          <a:xfrm>
+            <a:off x="1264238" y="1444500"/>
+            <a:ext cx="9663524" cy="5203436"/>
+          </a:xfrm>
+          <a:prstGeom prst="rect">
+            <a:avLst/>
+          </a:prstGeom>
+        </p:spPr>
+      </p:pic>
+    </p:spTree>
+    <p:extLst>
+      <p:ext uri="{BB962C8B-B14F-4D97-AF65-F5344CB8AC3E}">
+        <p14:creationId xmlns:p14="http://schemas.microsoft.com/office/powerpoint/2010/main" val="485118184"/>
+      </p:ext>
+    </p:extLst>
+  </p:cSld>
+  <p:clrMapOvr>
+    <a:masterClrMapping/>
+  </p:clrMapOvr>
+  <p:timing>
+    <p:tnLst>
+      <p:par>
+        <p:cTn id="1" dur="indefinite" restart="never" nodeType="tmRoot"/>
+      </p:par>
+    </p:tnLst>
+  </p:timing>
+</p:sld>
+</file>
+
+<file path=ppt/slides/slide15.xml><?xml version="1.0" encoding="utf-8"?>
+<p:sld xmlns:a="http://schemas.openxmlformats.org/drawingml/2006/main" xmlns:r="http://schemas.openxmlformats.org/officeDocument/2006/relationships" xmlns:p="http://schemas.openxmlformats.org/presentationml/2006/main">
+  <p:cSld>
+    <p:spTree>
+      <p:nvGrpSpPr>
+        <p:cNvPr id="1" name=""/>
+        <p:cNvGrpSpPr/>
+        <p:nvPr/>
+      </p:nvGrpSpPr>
+      <p:grpSpPr>
+        <a:xfrm>
+          <a:off x="0" y="0"/>
+          <a:ext cx="0" cy="0"/>
+          <a:chOff x="0" y="0"/>
+          <a:chExt cx="0" cy="0"/>
+        </a:xfrm>
+      </p:grpSpPr>
+      <p:sp>
+        <p:nvSpPr>
+          <p:cNvPr id="2" name="标题 1"/>
+          <p:cNvSpPr>
+            <a:spLocks noGrp="1"/>
+          </p:cNvSpPr>
+          <p:nvPr>
+            <p:ph type="title"/>
+          </p:nvPr>
+        </p:nvSpPr>
+        <p:spPr/>
+        <p:txBody>
+          <a:bodyPr/>
+          <a:lstStyle/>
+          <a:p>
+            <a:r>
+              <a:rPr lang="zh-CN" altLang="en-US" dirty="0" smtClean="0"/>
+              <a:t>泛型函数式接口</a:t>
+            </a:r>
+            <a:endParaRPr lang="zh-CN" altLang="en-US" dirty="0"/>
+          </a:p>
+        </p:txBody>
+      </p:sp>
+      <p:pic>
+        <p:nvPicPr>
+          <p:cNvPr id="4" name="内容占位符 3"/>
+          <p:cNvPicPr>
+            <a:picLocks noGrp="1" noChangeAspect="1"/>
+          </p:cNvPicPr>
+          <p:nvPr>
+            <p:ph idx="1"/>
+          </p:nvPr>
+        </p:nvPicPr>
+        <p:blipFill>
+          <a:blip r:embed="rId2"/>
+          <a:stretch>
+            <a:fillRect/>
+          </a:stretch>
+        </p:blipFill>
+        <p:spPr>
+          <a:xfrm>
+            <a:off x="838200" y="2240086"/>
+            <a:ext cx="10515600" cy="2720932"/>
+          </a:xfrm>
+          <a:prstGeom prst="rect">
+            <a:avLst/>
+          </a:prstGeom>
+        </p:spPr>
+      </p:pic>
+    </p:spTree>
+    <p:extLst>
+      <p:ext uri="{BB962C8B-B14F-4D97-AF65-F5344CB8AC3E}">
+        <p14:creationId xmlns:p14="http://schemas.microsoft.com/office/powerpoint/2010/main" val="3930998835"/>
+      </p:ext>
+    </p:extLst>
+  </p:cSld>
+  <p:clrMapOvr>
+    <a:masterClrMapping/>
+  </p:clrMapOvr>
+  <p:timing>
+    <p:tnLst>
+      <p:par>
+        <p:cTn id="1" dur="indefinite" restart="never" nodeType="tmRoot"/>
+      </p:par>
+    </p:tnLst>
+  </p:timing>
+</p:sld>
+</file>
+
+<file path=ppt/slides/slide16.xml><?xml version="1.0" encoding="utf-8"?>
+<p:sld xmlns:a="http://schemas.openxmlformats.org/drawingml/2006/main" xmlns:r="http://schemas.openxmlformats.org/officeDocument/2006/relationships" xmlns:p="http://schemas.openxmlformats.org/presentationml/2006/main">
+  <p:cSld>
+    <p:spTree>
+      <p:nvGrpSpPr>
+        <p:cNvPr id="1" name=""/>
+        <p:cNvGrpSpPr/>
+        <p:nvPr/>
+      </p:nvGrpSpPr>
+      <p:grpSpPr>
+        <a:xfrm>
+          <a:off x="0" y="0"/>
+          <a:ext cx="0" cy="0"/>
+          <a:chOff x="0" y="0"/>
+          <a:chExt cx="0" cy="0"/>
+        </a:xfrm>
+      </p:grpSpPr>
+      <p:sp>
+        <p:nvSpPr>
+          <p:cNvPr id="2" name="标题 1"/>
+          <p:cNvSpPr>
+            <a:spLocks noGrp="1"/>
+          </p:cNvSpPr>
+          <p:nvPr>
+            <p:ph type="title"/>
+          </p:nvPr>
+        </p:nvSpPr>
+        <p:spPr/>
+        <p:txBody>
+          <a:bodyPr/>
+          <a:lstStyle/>
+          <a:p>
+            <a:r>
+              <a:rPr lang="zh-CN" altLang="en-US" dirty="0" smtClean="0"/>
+              <a:t>变量捕获</a:t>
+            </a:r>
+            <a:r>
+              <a:rPr lang="en-US" altLang="zh-CN" dirty="0" smtClean="0"/>
+              <a:t>——</a:t>
+            </a:r>
+            <a:r>
+              <a:rPr lang="zh-CN" altLang="en-US" dirty="0" smtClean="0"/>
+              <a:t>闭包</a:t>
+            </a:r>
+            <a:endParaRPr lang="zh-CN" altLang="en-US" dirty="0"/>
+          </a:p>
+        </p:txBody>
+      </p:sp>
+      <p:sp>
+        <p:nvSpPr>
+          <p:cNvPr id="3" name="内容占位符 2"/>
+          <p:cNvSpPr>
+            <a:spLocks noGrp="1"/>
+          </p:cNvSpPr>
+          <p:nvPr>
+            <p:ph idx="1"/>
+          </p:nvPr>
+        </p:nvSpPr>
+        <p:spPr/>
+        <p:txBody>
+          <a:bodyPr/>
+          <a:lstStyle/>
+          <a:p>
+            <a:pPr marL="514350" indent="-514350">
+              <a:buAutoNum type="arabicPeriod"/>
+            </a:pPr>
+            <a:r>
+              <a:rPr lang="en-US" altLang="zh-CN" dirty="0"/>
+              <a:t>C</a:t>
+            </a:r>
+            <a:r>
+              <a:rPr lang="en-US" altLang="zh-CN" dirty="0" smtClean="0"/>
+              <a:t>apture-by-value</a:t>
+            </a:r>
+          </a:p>
+          <a:p>
+            <a:pPr marL="514350" indent="-514350">
+              <a:buAutoNum type="arabicPeriod"/>
+            </a:pPr>
+            <a:r>
+              <a:rPr lang="en-US" altLang="zh-CN" dirty="0" smtClean="0"/>
+              <a:t>Parallel</a:t>
+            </a:r>
+          </a:p>
+          <a:p>
+            <a:pPr marL="514350" indent="-514350">
+              <a:buAutoNum type="arabicPeriod"/>
+            </a:pPr>
+            <a:endParaRPr lang="en-US" altLang="zh-CN" dirty="0"/>
+          </a:p>
+        </p:txBody>
+      </p:sp>
+      <p:pic>
+        <p:nvPicPr>
+          <p:cNvPr id="4" name="图片 3"/>
+          <p:cNvPicPr>
+            <a:picLocks noChangeAspect="1"/>
+          </p:cNvPicPr>
+          <p:nvPr/>
+        </p:nvPicPr>
+        <p:blipFill>
+          <a:blip r:embed="rId2"/>
+          <a:stretch>
+            <a:fillRect/>
+          </a:stretch>
+        </p:blipFill>
+        <p:spPr>
+          <a:xfrm>
+            <a:off x="838200" y="3091529"/>
+            <a:ext cx="10515600" cy="3094730"/>
+          </a:xfrm>
+          <a:prstGeom prst="rect">
+            <a:avLst/>
+          </a:prstGeom>
+        </p:spPr>
+      </p:pic>
+    </p:spTree>
+    <p:extLst>
+      <p:ext uri="{BB962C8B-B14F-4D97-AF65-F5344CB8AC3E}">
+        <p14:creationId xmlns:p14="http://schemas.microsoft.com/office/powerpoint/2010/main" val="773625951"/>
+      </p:ext>
+    </p:extLst>
+  </p:cSld>
+  <p:clrMapOvr>
+    <a:masterClrMapping/>
+  </p:clrMapOvr>
+  <p:timing>
+    <p:tnLst>
+      <p:par>
+        <p:cTn id="1" dur="indefinite" restart="never" nodeType="tmRoot"/>
+      </p:par>
+    </p:tnLst>
+  </p:timing>
+</p:sld>
+</file>
+
+<file path=ppt/slides/slide17.xml><?xml version="1.0" encoding="utf-8"?>
+<p:sld xmlns:a="http://schemas.openxmlformats.org/drawingml/2006/main" xmlns:r="http://schemas.openxmlformats.org/officeDocument/2006/relationships" xmlns:p="http://schemas.openxmlformats.org/presentationml/2006/main">
+  <p:cSld>
+    <p:spTree>
+      <p:nvGrpSpPr>
+        <p:cNvPr id="1" name=""/>
+        <p:cNvGrpSpPr/>
+        <p:nvPr/>
+      </p:nvGrpSpPr>
+      <p:grpSpPr>
+        <a:xfrm>
+          <a:off x="0" y="0"/>
+          <a:ext cx="0" cy="0"/>
+          <a:chOff x="0" y="0"/>
+          <a:chExt cx="0" cy="0"/>
+        </a:xfrm>
+      </p:grpSpPr>
+      <p:sp>
+        <p:nvSpPr>
+          <p:cNvPr id="2" name="标题 1"/>
+          <p:cNvSpPr>
+            <a:spLocks noGrp="1"/>
+          </p:cNvSpPr>
+          <p:nvPr>
+            <p:ph type="title"/>
+          </p:nvPr>
+        </p:nvSpPr>
+        <p:spPr/>
+        <p:txBody>
+          <a:bodyPr/>
+          <a:lstStyle/>
+          <a:p>
+            <a:r>
+              <a:rPr lang="en-US" altLang="zh-CN" dirty="0" smtClean="0"/>
+              <a:t>Lambda in Java</a:t>
+            </a:r>
+            <a:endParaRPr lang="zh-CN" altLang="en-US" dirty="0"/>
+          </a:p>
+        </p:txBody>
+      </p:sp>
+      <p:sp>
+        <p:nvSpPr>
+          <p:cNvPr id="3" name="内容占位符 2"/>
+          <p:cNvSpPr>
+            <a:spLocks noGrp="1"/>
+          </p:cNvSpPr>
+          <p:nvPr>
+            <p:ph idx="1"/>
+          </p:nvPr>
+        </p:nvSpPr>
+        <p:spPr/>
+        <p:txBody>
+          <a:bodyPr/>
+          <a:lstStyle/>
+          <a:p>
+            <a:pPr marL="0" indent="0">
+              <a:buNone/>
+            </a:pPr>
+            <a:r>
+              <a:rPr lang="zh-CN" altLang="en-US" dirty="0"/>
+              <a:t>在</a:t>
+            </a:r>
+            <a:r>
+              <a:rPr lang="en-US" altLang="zh-CN" dirty="0"/>
+              <a:t>Java</a:t>
+            </a:r>
+            <a:r>
+              <a:rPr lang="zh-CN" altLang="en-US" dirty="0"/>
+              <a:t>中，</a:t>
+            </a:r>
+            <a:r>
+              <a:rPr lang="en-US" altLang="zh-CN" dirty="0"/>
+              <a:t>Lambda</a:t>
+            </a:r>
+            <a:r>
+              <a:rPr lang="zh-CN" altLang="en-US" dirty="0"/>
+              <a:t>表达式有其相应的函数式接口，还有类型推断机制。</a:t>
+            </a:r>
+          </a:p>
+        </p:txBody>
+      </p:sp>
+    </p:spTree>
+    <p:extLst>
+      <p:ext uri="{BB962C8B-B14F-4D97-AF65-F5344CB8AC3E}">
+        <p14:creationId xmlns:p14="http://schemas.microsoft.com/office/powerpoint/2010/main" val="2470962292"/>
+      </p:ext>
+    </p:extLst>
+  </p:cSld>
+  <p:clrMapOvr>
+    <a:masterClrMapping/>
+  </p:clrMapOvr>
+  <p:timing>
+    <p:tnLst>
+      <p:par>
+        <p:cTn id="1" dur="indefinite" restart="never" nodeType="tmRoot"/>
+      </p:par>
+    </p:tnLst>
+  </p:timing>
+</p:sld>
+</file>
+
+<file path=ppt/slides/slide18.xml><?xml version="1.0" encoding="utf-8"?>
+<p:sld xmlns:a="http://schemas.openxmlformats.org/drawingml/2006/main" xmlns:r="http://schemas.openxmlformats.org/officeDocument/2006/relationships" xmlns:p="http://schemas.openxmlformats.org/presentationml/2006/main">
+  <p:cSld>
+    <p:spTree>
+      <p:nvGrpSpPr>
+        <p:cNvPr id="1" name=""/>
+        <p:cNvGrpSpPr/>
+        <p:nvPr/>
+      </p:nvGrpSpPr>
+      <p:grpSpPr>
+        <a:xfrm>
+          <a:off x="0" y="0"/>
+          <a:ext cx="0" cy="0"/>
+          <a:chOff x="0" y="0"/>
+          <a:chExt cx="0" cy="0"/>
+        </a:xfrm>
+      </p:grpSpPr>
+      <p:sp>
+        <p:nvSpPr>
+          <p:cNvPr id="2" name="标题 1"/>
+          <p:cNvSpPr>
+            <a:spLocks noGrp="1"/>
+          </p:cNvSpPr>
+          <p:nvPr>
+            <p:ph type="title"/>
+          </p:nvPr>
+        </p:nvSpPr>
+        <p:spPr/>
+        <p:txBody>
+          <a:bodyPr/>
+          <a:lstStyle/>
+          <a:p>
+            <a:r>
+              <a:rPr lang="zh-CN" altLang="en-US" dirty="0"/>
+              <a:t>总结</a:t>
+            </a:r>
+          </a:p>
+        </p:txBody>
+      </p:sp>
+      <p:sp>
+        <p:nvSpPr>
+          <p:cNvPr id="3" name="内容占位符 2"/>
+          <p:cNvSpPr>
+            <a:spLocks noGrp="1"/>
+          </p:cNvSpPr>
+          <p:nvPr>
+            <p:ph idx="1"/>
+          </p:nvPr>
+        </p:nvSpPr>
+        <p:spPr/>
+        <p:txBody>
+          <a:bodyPr/>
+          <a:lstStyle/>
+          <a:p>
+            <a:endParaRPr lang="zh-CN" altLang="en-US"/>
+          </a:p>
+        </p:txBody>
+      </p:sp>
+    </p:spTree>
+    <p:extLst>
+      <p:ext uri="{BB962C8B-B14F-4D97-AF65-F5344CB8AC3E}">
+        <p14:creationId xmlns:p14="http://schemas.microsoft.com/office/powerpoint/2010/main" val="3004334277"/>
+      </p:ext>
+    </p:extLst>
+  </p:cSld>
+  <p:clrMapOvr>
+    <a:masterClrMapping/>
+  </p:clrMapOvr>
+  <p:timing>
+    <p:tnLst>
+      <p:par>
+        <p:cTn id="1" dur="indefinite" restart="never" nodeType="tmRoot"/>
+      </p:par>
+    </p:tnLst>
+  </p:timing>
+</p:sld>
+</file>
+
+<file path=ppt/slides/slide19.xml><?xml version="1.0" encoding="utf-8"?>
+<p:sld xmlns:a="http://schemas.openxmlformats.org/drawingml/2006/main" xmlns:r="http://schemas.openxmlformats.org/officeDocument/2006/relationships" xmlns:p="http://schemas.openxmlformats.org/presentationml/2006/main">
+  <p:cSld>
+    <p:spTree>
+      <p:nvGrpSpPr>
+        <p:cNvPr id="1" name=""/>
+        <p:cNvGrpSpPr/>
+        <p:nvPr/>
+      </p:nvGrpSpPr>
+      <p:grpSpPr>
+        <a:xfrm>
+          <a:off x="0" y="0"/>
+          <a:ext cx="0" cy="0"/>
+          <a:chOff x="0" y="0"/>
+          <a:chExt cx="0" cy="0"/>
+        </a:xfrm>
+      </p:grpSpPr>
+      <p:sp>
+        <p:nvSpPr>
+          <p:cNvPr id="2" name="标题 1"/>
+          <p:cNvSpPr>
+            <a:spLocks noGrp="1"/>
+          </p:cNvSpPr>
+          <p:nvPr>
+            <p:ph type="title"/>
+          </p:nvPr>
+        </p:nvSpPr>
+        <p:spPr/>
+        <p:txBody>
+          <a:bodyPr/>
+          <a:lstStyle/>
+          <a:p>
+            <a:r>
+              <a:rPr lang="zh-CN" altLang="en-US" dirty="0" smtClean="0"/>
+              <a:t>参考资料</a:t>
+            </a:r>
+            <a:endParaRPr lang="zh-CN" altLang="en-US" dirty="0"/>
+          </a:p>
+        </p:txBody>
+      </p:sp>
+      <p:sp>
+        <p:nvSpPr>
+          <p:cNvPr id="3" name="内容占位符 2"/>
+          <p:cNvSpPr>
+            <a:spLocks noGrp="1"/>
+          </p:cNvSpPr>
+          <p:nvPr>
+            <p:ph idx="1"/>
+          </p:nvPr>
+        </p:nvSpPr>
+        <p:spPr/>
+        <p:txBody>
+          <a:bodyPr>
+            <a:normAutofit fontScale="85000" lnSpcReduction="20000"/>
+          </a:bodyPr>
+          <a:lstStyle/>
+          <a:p>
+            <a:pPr marL="0" indent="0">
+              <a:buNone/>
+            </a:pPr>
+            <a:r>
+              <a:rPr lang="en-US" altLang="zh-CN" dirty="0" smtClean="0"/>
+              <a:t>[1]</a:t>
+            </a:r>
+          </a:p>
+          <a:p>
+            <a:pPr marL="0" indent="0">
+              <a:buNone/>
+            </a:pPr>
+            <a:endParaRPr lang="en-US" altLang="zh-CN" dirty="0"/>
+          </a:p>
+          <a:p>
+            <a:pPr marL="0" indent="0">
+              <a:buNone/>
+            </a:pPr>
+            <a:endParaRPr lang="en-US" altLang="zh-CN" dirty="0" smtClean="0"/>
+          </a:p>
+          <a:p>
+            <a:pPr marL="0" indent="0">
+              <a:buNone/>
+            </a:pPr>
+            <a:endParaRPr lang="en-US" altLang="zh-CN" dirty="0" smtClean="0"/>
+          </a:p>
+          <a:p>
+            <a:pPr marL="0" indent="0">
+              <a:buNone/>
+            </a:pPr>
+            <a:endParaRPr lang="en-US" altLang="zh-CN" dirty="0" smtClean="0"/>
+          </a:p>
+          <a:p>
+            <a:pPr marL="0" indent="0">
+              <a:buNone/>
+            </a:pPr>
+            <a:r>
+              <a:rPr lang="en-US" altLang="zh-CN" dirty="0" smtClean="0"/>
+              <a:t>[x] </a:t>
+            </a:r>
+            <a:r>
+              <a:rPr lang="en-US" altLang="zh-CN" dirty="0"/>
+              <a:t>Java 8</a:t>
+            </a:r>
+            <a:r>
+              <a:rPr lang="zh-CN" altLang="en-US" dirty="0"/>
+              <a:t>编程参考官方教程（第</a:t>
+            </a:r>
+            <a:r>
+              <a:rPr lang="en-US" altLang="zh-CN" dirty="0"/>
+              <a:t>9</a:t>
+            </a:r>
+            <a:r>
+              <a:rPr lang="zh-CN" altLang="en-US" dirty="0"/>
+              <a:t>版</a:t>
+            </a:r>
+            <a:r>
+              <a:rPr lang="zh-CN" altLang="en-US" dirty="0" smtClean="0"/>
+              <a:t>）</a:t>
+            </a:r>
+            <a:endParaRPr lang="zh-CN" altLang="en-US" dirty="0"/>
+          </a:p>
+          <a:p>
+            <a:pPr marL="0" indent="0">
+              <a:buNone/>
+            </a:pPr>
+            <a:r>
+              <a:rPr lang="en-US" altLang="zh-CN" dirty="0" smtClean="0"/>
+              <a:t>[x] </a:t>
+            </a:r>
+            <a:r>
+              <a:rPr lang="zh-CN" altLang="en-US" dirty="0" smtClean="0">
+                <a:hlinkClick r:id="rId2"/>
+              </a:rPr>
+              <a:t>深入</a:t>
+            </a:r>
+            <a:r>
+              <a:rPr lang="zh-CN" altLang="en-US" dirty="0">
+                <a:hlinkClick r:id="rId2"/>
+              </a:rPr>
+              <a:t>理解</a:t>
+            </a:r>
+            <a:r>
+              <a:rPr lang="en-US" altLang="zh-CN" dirty="0">
+                <a:hlinkClick r:id="rId2"/>
+              </a:rPr>
+              <a:t>Java</a:t>
+            </a:r>
+            <a:r>
+              <a:rPr lang="zh-CN" altLang="en-US" dirty="0">
+                <a:hlinkClick r:id="rId2"/>
+              </a:rPr>
+              <a:t>函数式编程和</a:t>
+            </a:r>
+            <a:r>
+              <a:rPr lang="en-US" altLang="zh-CN" dirty="0">
+                <a:hlinkClick r:id="rId2"/>
+              </a:rPr>
+              <a:t>Streams </a:t>
+            </a:r>
+            <a:r>
+              <a:rPr lang="en-US" altLang="zh-CN" dirty="0" smtClean="0">
+                <a:hlinkClick r:id="rId2"/>
+              </a:rPr>
+              <a:t>API</a:t>
+            </a:r>
+            <a:endParaRPr lang="en-US" altLang="zh-CN" dirty="0"/>
+          </a:p>
+          <a:p>
+            <a:pPr marL="0" indent="0">
+              <a:buNone/>
+            </a:pPr>
+            <a:r>
+              <a:rPr lang="en-US" altLang="zh-CN" dirty="0" smtClean="0"/>
+              <a:t>[x] </a:t>
+            </a:r>
+            <a:r>
+              <a:rPr lang="en-US" altLang="zh-CN" dirty="0" smtClean="0">
+                <a:hlinkClick r:id="rId3"/>
+              </a:rPr>
+              <a:t>The </a:t>
+            </a:r>
+            <a:r>
+              <a:rPr lang="en-US" altLang="zh-CN" dirty="0">
+                <a:hlinkClick r:id="rId3"/>
+              </a:rPr>
+              <a:t>Java® Language </a:t>
+            </a:r>
+            <a:r>
+              <a:rPr lang="en-US" altLang="zh-CN" dirty="0" smtClean="0">
+                <a:hlinkClick r:id="rId3"/>
+              </a:rPr>
+              <a:t>Specification</a:t>
+            </a:r>
+            <a:endParaRPr lang="en-US" altLang="zh-CN" dirty="0"/>
+          </a:p>
+          <a:p>
+            <a:pPr marL="0" indent="0">
+              <a:buNone/>
+            </a:pPr>
+            <a:r>
+              <a:rPr lang="en-US" altLang="zh-CN" dirty="0" smtClean="0"/>
+              <a:t>[x] </a:t>
+            </a:r>
+            <a:r>
+              <a:rPr lang="en-US" altLang="zh-CN" dirty="0"/>
+              <a:t>Java 8 Lambdas, Richard </a:t>
+            </a:r>
+            <a:r>
+              <a:rPr lang="en-US" altLang="zh-CN" dirty="0" smtClean="0"/>
+              <a:t>Warburton</a:t>
+            </a:r>
+            <a:endParaRPr lang="en-US" altLang="zh-CN" dirty="0"/>
+          </a:p>
+          <a:p>
+            <a:pPr marL="0" indent="0">
+              <a:buNone/>
+            </a:pPr>
+            <a:r>
+              <a:rPr lang="en-US" altLang="zh-CN" dirty="0" smtClean="0"/>
+              <a:t>[x] </a:t>
+            </a:r>
+            <a:r>
+              <a:rPr lang="en-US" altLang="zh-CN" dirty="0"/>
+              <a:t>Beginning Java 8 Language Features, </a:t>
+            </a:r>
+            <a:r>
+              <a:rPr lang="en-US" altLang="zh-CN" dirty="0" err="1"/>
+              <a:t>Kishori</a:t>
+            </a:r>
+            <a:r>
+              <a:rPr lang="en-US" altLang="zh-CN" dirty="0"/>
+              <a:t> </a:t>
+            </a:r>
+            <a:r>
+              <a:rPr lang="en-US" altLang="zh-CN" dirty="0" err="1" smtClean="0"/>
+              <a:t>Sharan</a:t>
+            </a:r>
+            <a:endParaRPr lang="en-US" altLang="zh-CN" dirty="0"/>
+          </a:p>
+          <a:p>
+            <a:pPr marL="0" indent="0">
+              <a:buNone/>
+            </a:pPr>
+            <a:r>
+              <a:rPr lang="en-US" altLang="zh-CN" dirty="0" smtClean="0"/>
+              <a:t>[x] </a:t>
+            </a:r>
+            <a:r>
+              <a:rPr lang="en-US" altLang="zh-CN" dirty="0">
+                <a:hlinkClick r:id="rId4"/>
+              </a:rPr>
+              <a:t>http://cr.openjdk.java.net/~briangoetz/lambda/lambda-state-final.html</a:t>
+            </a:r>
+            <a:endParaRPr lang="zh-CN" altLang="en-US" dirty="0"/>
+          </a:p>
+        </p:txBody>
+      </p:sp>
+    </p:spTree>
+    <p:extLst>
+      <p:ext uri="{BB962C8B-B14F-4D97-AF65-F5344CB8AC3E}">
+        <p14:creationId xmlns:p14="http://schemas.microsoft.com/office/powerpoint/2010/main" val="686133711"/>
+      </p:ext>
+    </p:extLst>
+  </p:cSld>
+  <p:clrMapOvr>
+    <a:masterClrMapping/>
+  </p:clrMapOvr>
+  <p:timing>
+    <p:tnLst>
+      <p:par>
+        <p:cTn id="1" dur="indefinite" restart="never" nodeType="tmRoot"/>
+      </p:par>
+    </p:tnLst>
+  </p:timing>
 </p:sld>
 </file>
 
@@ -3140,7 +4478,11 @@
           <a:bodyPr/>
           <a:lstStyle/>
           <a:p>
-            <a:endParaRPr lang="zh-CN" altLang="en-US"/>
+            <a:r>
+              <a:rPr lang="zh-CN" altLang="en-US" dirty="0" smtClean="0"/>
+              <a:t>目录</a:t>
+            </a:r>
+            <a:endParaRPr lang="zh-CN" altLang="en-US" dirty="0"/>
           </a:p>
         </p:txBody>
       </p:sp>
@@ -3159,7 +4501,41 @@
           <a:bodyPr/>
           <a:lstStyle/>
           <a:p>
-            <a:endParaRPr lang="zh-CN" altLang="en-US"/>
+            <a:r>
+              <a:rPr lang="en-US" altLang="zh-CN" dirty="0" smtClean="0"/>
+              <a:t>Lambda</a:t>
+            </a:r>
+            <a:r>
+              <a:rPr lang="zh-CN" altLang="en-US" dirty="0" smtClean="0"/>
+              <a:t>演算</a:t>
+            </a:r>
+            <a:endParaRPr lang="en-US" altLang="zh-CN" dirty="0" smtClean="0"/>
+          </a:p>
+          <a:p>
+            <a:r>
+              <a:rPr lang="en-US" altLang="zh-CN" dirty="0" smtClean="0"/>
+              <a:t>Lambda in C++</a:t>
+            </a:r>
+          </a:p>
+          <a:p>
+            <a:r>
+              <a:rPr lang="en-US" altLang="zh-CN" dirty="0" smtClean="0"/>
+              <a:t>Lambda in Java</a:t>
+            </a:r>
+          </a:p>
+          <a:p>
+            <a:r>
+              <a:rPr lang="zh-CN" altLang="en-US" dirty="0" smtClean="0"/>
+              <a:t>总结</a:t>
+            </a:r>
+            <a:endParaRPr lang="en-US" altLang="zh-CN" dirty="0" smtClean="0"/>
+          </a:p>
+          <a:p>
+            <a:r>
+              <a:rPr lang="zh-CN" altLang="en-US" dirty="0"/>
+              <a:t>参考资料</a:t>
+            </a:r>
+            <a:endParaRPr lang="zh-CN" altLang="en-US" dirty="0"/>
           </a:p>
         </p:txBody>
       </p:sp>
@@ -3173,6 +4549,13 @@
   <p:clrMapOvr>
     <a:masterClrMapping/>
   </p:clrMapOvr>
+  <p:timing>
+    <p:tnLst>
+      <p:par>
+        <p:cTn id="1" dur="indefinite" restart="never" nodeType="tmRoot"/>
+      </p:par>
+    </p:tnLst>
+  </p:timing>
 </p:sld>
 </file>
 
@@ -3241,6 +4624,13 @@
   <p:clrMapOvr>
     <a:masterClrMapping/>
   </p:clrMapOvr>
+  <p:timing>
+    <p:tnLst>
+      <p:par>
+        <p:cTn id="1" dur="indefinite" restart="never" nodeType="tmRoot"/>
+      </p:par>
+    </p:tnLst>
+  </p:timing>
 </p:sld>
 </file>
 
@@ -3309,6 +4699,13 @@
   <p:clrMapOvr>
     <a:masterClrMapping/>
   </p:clrMapOvr>
+  <p:timing>
+    <p:tnLst>
+      <p:par>
+        <p:cTn id="1" dur="indefinite" restart="never" nodeType="tmRoot"/>
+      </p:par>
+    </p:tnLst>
+  </p:timing>
 </p:sld>
 </file>
 
@@ -3344,7 +4741,15 @@
           <a:bodyPr/>
           <a:lstStyle/>
           <a:p>
-            <a:endParaRPr lang="zh-CN" altLang="en-US"/>
+            <a:r>
+              <a:rPr lang="en-US" altLang="zh-CN" dirty="0" smtClean="0"/>
+              <a:t>Java 8 buff——lambda</a:t>
+            </a:r>
+            <a:r>
+              <a:rPr lang="zh-CN" altLang="en-US" dirty="0" smtClean="0"/>
+              <a:t>表达式</a:t>
+            </a:r>
+            <a:endParaRPr lang="zh-CN" altLang="en-US" dirty="0"/>
           </a:p>
         </p:txBody>
       </p:sp>
@@ -3363,7 +4768,38 @@
           <a:bodyPr/>
           <a:lstStyle/>
           <a:p>
-            <a:endParaRPr lang="zh-CN" altLang="en-US"/>
+            <a:r>
+              <a:rPr lang="zh-CN" altLang="en-US" dirty="0" smtClean="0"/>
+              <a:t>表达能力提升，并流线化了一些常用结构的实现方式；</a:t>
+            </a:r>
+            <a:endParaRPr lang="en-US" altLang="zh-CN" dirty="0" smtClean="0"/>
+          </a:p>
+          <a:p>
+            <a:r>
+              <a:rPr lang="en-US" altLang="zh-CN" dirty="0" smtClean="0"/>
+              <a:t>lambda</a:t>
+            </a:r>
+            <a:r>
+              <a:rPr lang="zh-CN" altLang="en-US" dirty="0" smtClean="0"/>
+              <a:t>表达式的加入也导致</a:t>
+            </a:r>
+            <a:r>
+              <a:rPr lang="en-US" altLang="zh-CN" dirty="0" smtClean="0"/>
+              <a:t>API</a:t>
+            </a:r>
+            <a:r>
+              <a:rPr lang="zh-CN" altLang="en-US" dirty="0" smtClean="0"/>
+              <a:t>库增加的新的功能，包括利用多核环境的并行处理功能变得更加容易，以及支持对数据执行管道操作的新的流</a:t>
+            </a:r>
+            <a:r>
+              <a:rPr lang="en-US" altLang="zh-CN" dirty="0" smtClean="0"/>
+              <a:t>API</a:t>
+            </a:r>
+            <a:r>
+              <a:rPr lang="zh-CN" altLang="en-US" dirty="0" smtClean="0"/>
+              <a:t>。</a:t>
+            </a:r>
+            <a:endParaRPr lang="en-US" altLang="zh-CN" dirty="0" smtClean="0"/>
           </a:p>
         </p:txBody>
       </p:sp>
@@ -3377,6 +4813,448 @@
   <p:clrMapOvr>
     <a:masterClrMapping/>
   </p:clrMapOvr>
+  <p:timing>
+    <p:tnLst>
+      <p:par>
+        <p:cTn id="1" dur="indefinite" restart="never" nodeType="tmRoot"/>
+      </p:par>
+    </p:tnLst>
+  </p:timing>
+</p:sld>
+</file>
+
+<file path=ppt/slides/slide6.xml><?xml version="1.0" encoding="utf-8"?>
+<p:sld xmlns:a="http://schemas.openxmlformats.org/drawingml/2006/main" xmlns:r="http://schemas.openxmlformats.org/officeDocument/2006/relationships" xmlns:p="http://schemas.openxmlformats.org/presentationml/2006/main">
+  <p:cSld>
+    <p:spTree>
+      <p:nvGrpSpPr>
+        <p:cNvPr id="1" name=""/>
+        <p:cNvGrpSpPr/>
+        <p:nvPr/>
+      </p:nvGrpSpPr>
+      <p:grpSpPr>
+        <a:xfrm>
+          <a:off x="0" y="0"/>
+          <a:ext cx="0" cy="0"/>
+          <a:chOff x="0" y="0"/>
+          <a:chExt cx="0" cy="0"/>
+        </a:xfrm>
+      </p:grpSpPr>
+      <p:sp>
+        <p:nvSpPr>
+          <p:cNvPr id="2" name="标题 1"/>
+          <p:cNvSpPr>
+            <a:spLocks noGrp="1"/>
+          </p:cNvSpPr>
+          <p:nvPr>
+            <p:ph type="title"/>
+          </p:nvPr>
+        </p:nvSpPr>
+        <p:spPr/>
+        <p:txBody>
+          <a:bodyPr/>
+          <a:lstStyle/>
+          <a:p>
+            <a:r>
+              <a:rPr lang="zh-CN" altLang="en-US" dirty="0" smtClean="0"/>
+              <a:t>语法</a:t>
+            </a:r>
+            <a:endParaRPr lang="zh-CN" altLang="en-US" dirty="0"/>
+          </a:p>
+        </p:txBody>
+      </p:sp>
+      <p:sp>
+        <p:nvSpPr>
+          <p:cNvPr id="3" name="内容占位符 2"/>
+          <p:cNvSpPr>
+            <a:spLocks noGrp="1"/>
+          </p:cNvSpPr>
+          <p:nvPr>
+            <p:ph idx="1"/>
+          </p:nvPr>
+        </p:nvSpPr>
+        <p:spPr/>
+        <p:txBody>
+          <a:bodyPr/>
+          <a:lstStyle/>
+          <a:p>
+            <a:r>
+              <a:rPr lang="zh-CN" altLang="en-US" dirty="0" smtClean="0"/>
+              <a:t>操作符</a:t>
+            </a:r>
+            <a:r>
+              <a:rPr lang="zh-CN" altLang="en-US" dirty="0"/>
+              <a:t>：</a:t>
+            </a:r>
+            <a:r>
+              <a:rPr lang="en-US" altLang="zh-CN" b="1" dirty="0" smtClean="0"/>
+              <a:t>-&gt;</a:t>
+            </a:r>
+          </a:p>
+          <a:p>
+            <a:r>
+              <a:rPr lang="zh-CN" altLang="en-US" dirty="0" smtClean="0"/>
+              <a:t>用法：</a:t>
+            </a:r>
+            <a:endParaRPr lang="en-US" altLang="zh-CN" dirty="0" smtClean="0"/>
+          </a:p>
+          <a:p>
+            <a:endParaRPr lang="en-US" altLang="zh-CN" dirty="0"/>
+          </a:p>
+          <a:p>
+            <a:endParaRPr lang="en-US" altLang="zh-CN" dirty="0" smtClean="0"/>
+          </a:p>
+          <a:p>
+            <a:endParaRPr lang="en-US" altLang="zh-CN" dirty="0"/>
+          </a:p>
+          <a:p>
+            <a:r>
+              <a:rPr lang="zh-CN" altLang="en-US" dirty="0" smtClean="0"/>
+              <a:t>参数 </a:t>
+            </a:r>
+            <a:r>
+              <a:rPr lang="en-US" altLang="zh-CN" dirty="0" smtClean="0"/>
+              <a:t>+ </a:t>
+            </a:r>
+            <a:r>
+              <a:rPr lang="zh-CN" altLang="en-US" dirty="0" smtClean="0"/>
+              <a:t>操作符</a:t>
+            </a:r>
+            <a:r>
+              <a:rPr lang="en-US" altLang="zh-CN" dirty="0" smtClean="0"/>
+              <a:t> + lambda</a:t>
+            </a:r>
+            <a:r>
+              <a:rPr lang="zh-CN" altLang="en-US" dirty="0" smtClean="0"/>
+              <a:t>体</a:t>
+            </a:r>
+            <a:endParaRPr lang="en-US" altLang="zh-CN" dirty="0"/>
+          </a:p>
+        </p:txBody>
+      </p:sp>
+      <p:pic>
+        <p:nvPicPr>
+          <p:cNvPr id="5" name="图片 4"/>
+          <p:cNvPicPr>
+            <a:picLocks noChangeAspect="1"/>
+          </p:cNvPicPr>
+          <p:nvPr/>
+        </p:nvPicPr>
+        <p:blipFill>
+          <a:blip r:embed="rId2"/>
+          <a:stretch>
+            <a:fillRect/>
+          </a:stretch>
+        </p:blipFill>
+        <p:spPr>
+          <a:xfrm>
+            <a:off x="838200" y="2737855"/>
+            <a:ext cx="10295238" cy="1592372"/>
+          </a:xfrm>
+          <a:prstGeom prst="rect">
+            <a:avLst/>
+          </a:prstGeom>
+        </p:spPr>
+      </p:pic>
+    </p:spTree>
+    <p:extLst>
+      <p:ext uri="{BB962C8B-B14F-4D97-AF65-F5344CB8AC3E}">
+        <p14:creationId xmlns:p14="http://schemas.microsoft.com/office/powerpoint/2010/main" val="4190687484"/>
+      </p:ext>
+    </p:extLst>
+  </p:cSld>
+  <p:clrMapOvr>
+    <a:masterClrMapping/>
+  </p:clrMapOvr>
+  <p:timing>
+    <p:tnLst>
+      <p:par>
+        <p:cTn id="1" dur="indefinite" restart="never" nodeType="tmRoot"/>
+      </p:par>
+    </p:tnLst>
+  </p:timing>
+</p:sld>
+</file>
+
+<file path=ppt/slides/slide7.xml><?xml version="1.0" encoding="utf-8"?>
+<p:sld xmlns:a="http://schemas.openxmlformats.org/drawingml/2006/main" xmlns:r="http://schemas.openxmlformats.org/officeDocument/2006/relationships" xmlns:p="http://schemas.openxmlformats.org/presentationml/2006/main">
+  <p:cSld>
+    <p:spTree>
+      <p:nvGrpSpPr>
+        <p:cNvPr id="1" name=""/>
+        <p:cNvGrpSpPr/>
+        <p:nvPr/>
+      </p:nvGrpSpPr>
+      <p:grpSpPr>
+        <a:xfrm>
+          <a:off x="0" y="0"/>
+          <a:ext cx="0" cy="0"/>
+          <a:chOff x="0" y="0"/>
+          <a:chExt cx="0" cy="0"/>
+        </a:xfrm>
+      </p:grpSpPr>
+      <p:sp>
+        <p:nvSpPr>
+          <p:cNvPr id="2" name="标题 1"/>
+          <p:cNvSpPr>
+            <a:spLocks noGrp="1"/>
+          </p:cNvSpPr>
+          <p:nvPr>
+            <p:ph type="title"/>
+          </p:nvPr>
+        </p:nvSpPr>
+        <p:spPr/>
+        <p:txBody>
+          <a:bodyPr/>
+          <a:lstStyle/>
+          <a:p>
+            <a:r>
+              <a:rPr lang="zh-CN" altLang="en-US" dirty="0" smtClean="0"/>
+              <a:t>语法</a:t>
+            </a:r>
+            <a:r>
+              <a:rPr lang="en-US" altLang="zh-CN" dirty="0" smtClean="0"/>
+              <a:t>——</a:t>
+            </a:r>
+            <a:r>
+              <a:rPr lang="zh-CN" altLang="en-US" dirty="0" smtClean="0"/>
+              <a:t>表达式体</a:t>
+            </a:r>
+            <a:endParaRPr lang="zh-CN" altLang="en-US" dirty="0"/>
+          </a:p>
+        </p:txBody>
+      </p:sp>
+      <p:pic>
+        <p:nvPicPr>
+          <p:cNvPr id="4" name="内容占位符 3"/>
+          <p:cNvPicPr>
+            <a:picLocks noGrp="1" noChangeAspect="1"/>
+          </p:cNvPicPr>
+          <p:nvPr>
+            <p:ph idx="1"/>
+          </p:nvPr>
+        </p:nvPicPr>
+        <p:blipFill>
+          <a:blip r:embed="rId2"/>
+          <a:stretch>
+            <a:fillRect/>
+          </a:stretch>
+        </p:blipFill>
+        <p:spPr>
+          <a:xfrm>
+            <a:off x="838200" y="1690688"/>
+            <a:ext cx="10515600" cy="3819421"/>
+          </a:xfrm>
+          <a:prstGeom prst="rect">
+            <a:avLst/>
+          </a:prstGeom>
+        </p:spPr>
+      </p:pic>
+    </p:spTree>
+    <p:extLst>
+      <p:ext uri="{BB962C8B-B14F-4D97-AF65-F5344CB8AC3E}">
+        <p14:creationId xmlns:p14="http://schemas.microsoft.com/office/powerpoint/2010/main" val="1520498894"/>
+      </p:ext>
+    </p:extLst>
+  </p:cSld>
+  <p:clrMapOvr>
+    <a:masterClrMapping/>
+  </p:clrMapOvr>
+  <p:timing>
+    <p:tnLst>
+      <p:par>
+        <p:cTn id="1" dur="indefinite" restart="never" nodeType="tmRoot"/>
+      </p:par>
+    </p:tnLst>
+  </p:timing>
+</p:sld>
+</file>
+
+<file path=ppt/slides/slide8.xml><?xml version="1.0" encoding="utf-8"?>
+<p:sld xmlns:a="http://schemas.openxmlformats.org/drawingml/2006/main" xmlns:r="http://schemas.openxmlformats.org/officeDocument/2006/relationships" xmlns:p="http://schemas.openxmlformats.org/presentationml/2006/main">
+  <p:cSld>
+    <p:spTree>
+      <p:nvGrpSpPr>
+        <p:cNvPr id="1" name=""/>
+        <p:cNvGrpSpPr/>
+        <p:nvPr/>
+      </p:nvGrpSpPr>
+      <p:grpSpPr>
+        <a:xfrm>
+          <a:off x="0" y="0"/>
+          <a:ext cx="0" cy="0"/>
+          <a:chOff x="0" y="0"/>
+          <a:chExt cx="0" cy="0"/>
+        </a:xfrm>
+      </p:grpSpPr>
+      <p:sp>
+        <p:nvSpPr>
+          <p:cNvPr id="2" name="标题 1"/>
+          <p:cNvSpPr>
+            <a:spLocks noGrp="1"/>
+          </p:cNvSpPr>
+          <p:nvPr>
+            <p:ph type="title"/>
+          </p:nvPr>
+        </p:nvSpPr>
+        <p:spPr/>
+        <p:txBody>
+          <a:bodyPr/>
+          <a:lstStyle/>
+          <a:p>
+            <a:r>
+              <a:rPr lang="zh-CN" altLang="en-US" dirty="0" smtClean="0"/>
+              <a:t>语法</a:t>
+            </a:r>
+            <a:r>
+              <a:rPr lang="en-US" altLang="zh-CN" dirty="0" smtClean="0"/>
+              <a:t>——</a:t>
+            </a:r>
+            <a:r>
+              <a:rPr lang="zh-CN" altLang="en-US" dirty="0" smtClean="0"/>
+              <a:t>作为参数传递</a:t>
+            </a:r>
+            <a:endParaRPr lang="zh-CN" altLang="en-US" dirty="0"/>
+          </a:p>
+        </p:txBody>
+      </p:sp>
+      <p:pic>
+        <p:nvPicPr>
+          <p:cNvPr id="4" name="内容占位符 3"/>
+          <p:cNvPicPr>
+            <a:picLocks noGrp="1" noChangeAspect="1"/>
+          </p:cNvPicPr>
+          <p:nvPr>
+            <p:ph idx="1"/>
+          </p:nvPr>
+        </p:nvPicPr>
+        <p:blipFill>
+          <a:blip r:embed="rId2"/>
+          <a:stretch>
+            <a:fillRect/>
+          </a:stretch>
+        </p:blipFill>
+        <p:spPr>
+          <a:xfrm>
+            <a:off x="838201" y="1913110"/>
+            <a:ext cx="10515600" cy="3834150"/>
+          </a:xfrm>
+          <a:prstGeom prst="rect">
+            <a:avLst/>
+          </a:prstGeom>
+        </p:spPr>
+      </p:pic>
+    </p:spTree>
+    <p:extLst>
+      <p:ext uri="{BB962C8B-B14F-4D97-AF65-F5344CB8AC3E}">
+        <p14:creationId xmlns:p14="http://schemas.microsoft.com/office/powerpoint/2010/main" val="2993881800"/>
+      </p:ext>
+    </p:extLst>
+  </p:cSld>
+  <p:clrMapOvr>
+    <a:masterClrMapping/>
+  </p:clrMapOvr>
+  <p:timing>
+    <p:tnLst>
+      <p:par>
+        <p:cTn id="1" dur="indefinite" restart="never" nodeType="tmRoot"/>
+      </p:par>
+    </p:tnLst>
+  </p:timing>
+</p:sld>
+</file>
+
+<file path=ppt/slides/slide9.xml><?xml version="1.0" encoding="utf-8"?>
+<p:sld xmlns:a="http://schemas.openxmlformats.org/drawingml/2006/main" xmlns:r="http://schemas.openxmlformats.org/officeDocument/2006/relationships" xmlns:p="http://schemas.openxmlformats.org/presentationml/2006/main">
+  <p:cSld>
+    <p:spTree>
+      <p:nvGrpSpPr>
+        <p:cNvPr id="1" name=""/>
+        <p:cNvGrpSpPr/>
+        <p:nvPr/>
+      </p:nvGrpSpPr>
+      <p:grpSpPr>
+        <a:xfrm>
+          <a:off x="0" y="0"/>
+          <a:ext cx="0" cy="0"/>
+          <a:chOff x="0" y="0"/>
+          <a:chExt cx="0" cy="0"/>
+        </a:xfrm>
+      </p:grpSpPr>
+      <p:sp>
+        <p:nvSpPr>
+          <p:cNvPr id="2" name="标题 1"/>
+          <p:cNvSpPr>
+            <a:spLocks noGrp="1"/>
+          </p:cNvSpPr>
+          <p:nvPr>
+            <p:ph type="title"/>
+          </p:nvPr>
+        </p:nvSpPr>
+        <p:spPr/>
+        <p:txBody>
+          <a:bodyPr/>
+          <a:lstStyle/>
+          <a:p>
+            <a:r>
+              <a:rPr lang="zh-CN" altLang="en-US" dirty="0" smtClean="0"/>
+              <a:t>语法</a:t>
+            </a:r>
+            <a:r>
+              <a:rPr lang="en-US" altLang="zh-CN" dirty="0" smtClean="0"/>
+              <a:t>——</a:t>
+            </a:r>
+            <a:r>
+              <a:rPr lang="zh-CN" altLang="en-US" dirty="0" smtClean="0"/>
+              <a:t>块体</a:t>
+            </a:r>
+            <a:endParaRPr lang="zh-CN" altLang="en-US" dirty="0"/>
+          </a:p>
+        </p:txBody>
+      </p:sp>
+      <p:pic>
+        <p:nvPicPr>
+          <p:cNvPr id="4" name="内容占位符 3"/>
+          <p:cNvPicPr>
+            <a:picLocks noGrp="1" noChangeAspect="1"/>
+          </p:cNvPicPr>
+          <p:nvPr>
+            <p:ph idx="1"/>
+          </p:nvPr>
+        </p:nvPicPr>
+        <p:blipFill>
+          <a:blip r:embed="rId2"/>
+          <a:stretch>
+            <a:fillRect/>
+          </a:stretch>
+        </p:blipFill>
+        <p:spPr>
+          <a:xfrm>
+            <a:off x="838200" y="2417630"/>
+            <a:ext cx="10515600" cy="1596695"/>
+          </a:xfrm>
+          <a:prstGeom prst="rect">
+            <a:avLst/>
+          </a:prstGeom>
+        </p:spPr>
+      </p:pic>
+    </p:spTree>
+    <p:extLst>
+      <p:ext uri="{BB962C8B-B14F-4D97-AF65-F5344CB8AC3E}">
+        <p14:creationId xmlns:p14="http://schemas.microsoft.com/office/powerpoint/2010/main" val="2503415632"/>
+      </p:ext>
+    </p:extLst>
+  </p:cSld>
+  <p:clrMapOvr>
+    <a:masterClrMapping/>
+  </p:clrMapOvr>
+  <p:timing>
+    <p:tnLst>
+      <p:par>
+        <p:cTn id="1" dur="indefinite" restart="never" nodeType="tmRoot"/>
+      </p:par>
+    </p:tnLst>
+  </p:timing>
 </p:sld>
 </file>
 
@@ -3421,76 +5299,16 @@
         <a:srgbClr val="954F72"/>
       </a:folHlink>
     </a:clrScheme>
-    <a:fontScheme name="Office">
+    <a:fontScheme name="Arial+Microsoft Yahei">
       <a:majorFont>
-        <a:latin typeface="等线 Light" panose="020F0302020204030204"/>
-        <a:ea typeface=""/>
+        <a:latin typeface="Arial"/>
+        <a:ea typeface="微软雅黑"/>
         <a:cs typeface=""/>
-        <a:font script="Jpan" typeface="游ゴシック Light"/>
-        <a:font script="Hang" typeface="맑은 고딕"/>
-        <a:font script="Hans" typeface="等线 Light"/>
-        <a:font script="Hant" typeface="新細明體"/>
-        <a:font script="Arab" typeface="Times New Roman"/>
-        <a:font script="Hebr" typeface="Times New Roman"/>
-        <a:font script="Thai" typeface="Angsana New"/>
-        <a:font script="Ethi" typeface="Nyala"/>
-        <a:font script="Beng" typeface="Vrinda"/>
-        <a:font script="Gujr" typeface="Shruti"/>
-        <a:font script="Khmr" typeface="MoolBoran"/>
-        <a:font script="Knda" typeface="Tunga"/>
-        <a:font script="Guru" typeface="Raavi"/>
-        <a:font script="Cans" typeface="Euphemia"/>
-        <a:font script="Cher" typeface="Plantagenet Cherokee"/>
-        <a:font script="Yiii" typeface="Microsoft Yi Baiti"/>
-        <a:font script="Tibt" typeface="Microsoft Himalaya"/>
-        <a:font script="Thaa" typeface="MV Boli"/>
-        <a:font script="Deva" typeface="Mangal"/>
-        <a:font script="Telu" typeface="Gautami"/>
-        <a:font script="Taml" typeface="Latha"/>
-        <a:font script="Syrc" typeface="Estrangelo Edessa"/>
-        <a:font script="Orya" typeface="Kalinga"/>
-        <a:font script="Mlym" typeface="Kartika"/>
-        <a:font script="Laoo" typeface="DokChampa"/>
-        <a:font script="Sinh" typeface="Iskoola Pota"/>
-        <a:font script="Mong" typeface="Mongolian Baiti"/>
-        <a:font script="Viet" typeface="Times New Roman"/>
-        <a:font script="Uigh" typeface="Microsoft Uighur"/>
-        <a:font script="Geor" typeface="Sylfaen"/>
       </a:majorFont>
       <a:minorFont>
-        <a:latin typeface="等线" panose="020F0502020204030204"/>
-        <a:ea typeface=""/>
+        <a:latin typeface="Arial"/>
+        <a:ea typeface="微软雅黑"/>
         <a:cs typeface=""/>
-        <a:font script="Jpan" typeface="游ゴシック"/>
-        <a:font script="Hang" typeface="맑은 고딕"/>
-        <a:font script="Hans" typeface="等线"/>
-        <a:font script="Hant" typeface="新細明體"/>
-        <a:font script="Arab" typeface="Arial"/>
-        <a:font script="Hebr" typeface="Arial"/>
-        <a:font script="Thai" typeface="Cordia New"/>
-        <a:font script="Ethi" typeface="Nyala"/>
-        <a:font script="Beng" typeface="Vrinda"/>
-        <a:font script="Gujr" typeface="Shruti"/>
-        <a:font script="Khmr" typeface="DaunPenh"/>
-        <a:font script="Knda" typeface="Tunga"/>
-        <a:font script="Guru" typeface="Raavi"/>
-        <a:font script="Cans" typeface="Euphemia"/>
-        <a:font script="Cher" typeface="Plantagenet Cherokee"/>
-        <a:font script="Yiii" typeface="Microsoft Yi Baiti"/>
-        <a:font script="Tibt" typeface="Microsoft Himalaya"/>
-        <a:font script="Thaa" typeface="MV Boli"/>
-        <a:font script="Deva" typeface="Mangal"/>
-        <a:font script="Telu" typeface="Gautami"/>
-        <a:font script="Taml" typeface="Latha"/>
-        <a:font script="Syrc" typeface="Estrangelo Edessa"/>
-        <a:font script="Orya" typeface="Kalinga"/>
-        <a:font script="Mlym" typeface="Kartika"/>
-        <a:font script="Laoo" typeface="DokChampa"/>
-        <a:font script="Sinh" typeface="Iskoola Pota"/>
-        <a:font script="Mong" typeface="Mongolian Baiti"/>
-        <a:font script="Viet" typeface="Arial"/>
-        <a:font script="Uigh" typeface="Microsoft Uighur"/>
-        <a:font script="Geor" typeface="Sylfaen"/>
       </a:minorFont>
     </a:fontScheme>
     <a:fmtScheme name="Office">

</xml_diff>